<commit_message>
updated report (algorithm description)
</commit_message>
<xml_diff>
--- a/report.pptx
+++ b/report.pptx
@@ -108,6 +108,11 @@
       </a:defRPr>
     </a:lvl9pPr>
   </p:defaultTextStyle>
+  <p:extLst>
+    <p:ext uri="{EFAFB233-063F-42B5-8137-9DF3F51BA10A}">
+      <p15:sldGuideLst xmlns:p15="http://schemas.microsoft.com/office/powerpoint/2012/main"/>
+    </p:ext>
+  </p:extLst>
 </p:presentation>
 </file>
 
@@ -258,7 +263,7 @@
           <a:p>
             <a:fld id="{DF3D152B-3CF3-479A-A5C1-3B8B1835E7BB}" type="datetimeFigureOut">
               <a:rPr lang="en-US" smtClean="0"/>
-              <a:t>3/9/2020</a:t>
+              <a:t>3/10/2020</a:t>
             </a:fld>
             <a:endParaRPr lang="en-US"/>
           </a:p>
@@ -456,7 +461,7 @@
           <a:p>
             <a:fld id="{DF3D152B-3CF3-479A-A5C1-3B8B1835E7BB}" type="datetimeFigureOut">
               <a:rPr lang="en-US" smtClean="0"/>
-              <a:t>3/9/2020</a:t>
+              <a:t>3/10/2020</a:t>
             </a:fld>
             <a:endParaRPr lang="en-US"/>
           </a:p>
@@ -664,7 +669,7 @@
           <a:p>
             <a:fld id="{DF3D152B-3CF3-479A-A5C1-3B8B1835E7BB}" type="datetimeFigureOut">
               <a:rPr lang="en-US" smtClean="0"/>
-              <a:t>3/9/2020</a:t>
+              <a:t>3/10/2020</a:t>
             </a:fld>
             <a:endParaRPr lang="en-US"/>
           </a:p>
@@ -862,7 +867,7 @@
           <a:p>
             <a:fld id="{DF3D152B-3CF3-479A-A5C1-3B8B1835E7BB}" type="datetimeFigureOut">
               <a:rPr lang="en-US" smtClean="0"/>
-              <a:t>3/9/2020</a:t>
+              <a:t>3/10/2020</a:t>
             </a:fld>
             <a:endParaRPr lang="en-US"/>
           </a:p>
@@ -1137,7 +1142,7 @@
           <a:p>
             <a:fld id="{DF3D152B-3CF3-479A-A5C1-3B8B1835E7BB}" type="datetimeFigureOut">
               <a:rPr lang="en-US" smtClean="0"/>
-              <a:t>3/9/2020</a:t>
+              <a:t>3/10/2020</a:t>
             </a:fld>
             <a:endParaRPr lang="en-US"/>
           </a:p>
@@ -1402,7 +1407,7 @@
           <a:p>
             <a:fld id="{DF3D152B-3CF3-479A-A5C1-3B8B1835E7BB}" type="datetimeFigureOut">
               <a:rPr lang="en-US" smtClean="0"/>
-              <a:t>3/9/2020</a:t>
+              <a:t>3/10/2020</a:t>
             </a:fld>
             <a:endParaRPr lang="en-US"/>
           </a:p>
@@ -1814,7 +1819,7 @@
           <a:p>
             <a:fld id="{DF3D152B-3CF3-479A-A5C1-3B8B1835E7BB}" type="datetimeFigureOut">
               <a:rPr lang="en-US" smtClean="0"/>
-              <a:t>3/9/2020</a:t>
+              <a:t>3/10/2020</a:t>
             </a:fld>
             <a:endParaRPr lang="en-US"/>
           </a:p>
@@ -1955,7 +1960,7 @@
           <a:p>
             <a:fld id="{DF3D152B-3CF3-479A-A5C1-3B8B1835E7BB}" type="datetimeFigureOut">
               <a:rPr lang="en-US" smtClean="0"/>
-              <a:t>3/9/2020</a:t>
+              <a:t>3/10/2020</a:t>
             </a:fld>
             <a:endParaRPr lang="en-US"/>
           </a:p>
@@ -2068,7 +2073,7 @@
           <a:p>
             <a:fld id="{DF3D152B-3CF3-479A-A5C1-3B8B1835E7BB}" type="datetimeFigureOut">
               <a:rPr lang="en-US" smtClean="0"/>
-              <a:t>3/9/2020</a:t>
+              <a:t>3/10/2020</a:t>
             </a:fld>
             <a:endParaRPr lang="en-US"/>
           </a:p>
@@ -2379,7 +2384,7 @@
           <a:p>
             <a:fld id="{DF3D152B-3CF3-479A-A5C1-3B8B1835E7BB}" type="datetimeFigureOut">
               <a:rPr lang="en-US" smtClean="0"/>
-              <a:t>3/9/2020</a:t>
+              <a:t>3/10/2020</a:t>
             </a:fld>
             <a:endParaRPr lang="en-US"/>
           </a:p>
@@ -2667,7 +2672,7 @@
           <a:p>
             <a:fld id="{DF3D152B-3CF3-479A-A5C1-3B8B1835E7BB}" type="datetimeFigureOut">
               <a:rPr lang="en-US" smtClean="0"/>
-              <a:t>3/9/2020</a:t>
+              <a:t>3/10/2020</a:t>
             </a:fld>
             <a:endParaRPr lang="en-US"/>
           </a:p>
@@ -2908,7 +2913,7 @@
           <a:p>
             <a:fld id="{DF3D152B-3CF3-479A-A5C1-3B8B1835E7BB}" type="datetimeFigureOut">
               <a:rPr lang="en-US" smtClean="0"/>
-              <a:t>3/9/2020</a:t>
+              <a:t>3/10/2020</a:t>
             </a:fld>
             <a:endParaRPr lang="en-US"/>
           </a:p>
@@ -3453,8 +3458,8 @@
           </a:p>
         </p:txBody>
       </p:sp>
-      <mc:AlternateContent xmlns:mc="http://schemas.openxmlformats.org/markup-compatibility/2006">
-        <mc:Choice xmlns:a14="http://schemas.microsoft.com/office/drawing/2010/main" Requires="a14">
+      <mc:AlternateContent xmlns:mc="http://schemas.openxmlformats.org/markup-compatibility/2006" xmlns:a14="http://schemas.microsoft.com/office/drawing/2010/main">
+        <mc:Choice Requires="a14">
           <p:sp>
             <p:nvSpPr>
               <p:cNvPr id="9" name="TextBox 8">
@@ -3842,7 +3847,7 @@
             </p:txBody>
           </p:sp>
         </mc:Choice>
-        <mc:Fallback>
+        <mc:Fallback xmlns="">
           <p:sp>
             <p:nvSpPr>
               <p:cNvPr id="9" name="TextBox 8">
@@ -3994,8 +3999,8 @@
           </a:prstGeom>
         </p:spPr>
       </p:pic>
-      <mc:AlternateContent xmlns:mc="http://schemas.openxmlformats.org/markup-compatibility/2006">
-        <mc:Choice xmlns:a14="http://schemas.microsoft.com/office/drawing/2010/main" Requires="a14">
+      <mc:AlternateContent xmlns:mc="http://schemas.openxmlformats.org/markup-compatibility/2006" xmlns:a14="http://schemas.microsoft.com/office/drawing/2010/main">
+        <mc:Choice Requires="a14">
           <p:sp>
             <p:nvSpPr>
               <p:cNvPr id="15" name="TextBox 14">
@@ -4190,7 +4195,7 @@
             </p:txBody>
           </p:sp>
         </mc:Choice>
-        <mc:Fallback>
+        <mc:Fallback xmlns="">
           <p:sp>
             <p:nvSpPr>
               <p:cNvPr id="15" name="TextBox 14">
@@ -4811,8 +4816,8 @@
           </a:p>
         </p:txBody>
       </p:sp>
-      <mc:AlternateContent xmlns:mc="http://schemas.openxmlformats.org/markup-compatibility/2006">
-        <mc:Choice xmlns:a14="http://schemas.microsoft.com/office/drawing/2010/main" Requires="a14">
+      <mc:AlternateContent xmlns:mc="http://schemas.openxmlformats.org/markup-compatibility/2006" xmlns:a14="http://schemas.microsoft.com/office/drawing/2010/main">
+        <mc:Choice Requires="a14">
           <p:sp>
             <p:nvSpPr>
               <p:cNvPr id="14" name="TextBox 13">
@@ -4841,6 +4846,7 @@
               </a:bodyPr>
               <a:lstStyle/>
               <a:p>
+                <a:pPr/>
                 <a14:m>
                   <m:oMathPara xmlns:m="http://schemas.openxmlformats.org/officeDocument/2006/math">
                     <m:oMathParaPr>
@@ -4869,19 +4875,7 @@
                               </a:solidFill>
                               <a:latin typeface="Cambria Math" panose="02040503050406030204" pitchFamily="18" charset="0"/>
                             </a:rPr>
-                            <m:t>A</m:t>
-                          </m:r>
-                          <m:r>
-                            <m:rPr>
-                              <m:sty m:val="p"/>
-                            </m:rPr>
-                            <a:rPr lang="en-US" b="0" i="0" smtClean="0">
-                              <a:solidFill>
-                                <a:srgbClr val="873C94"/>
-                              </a:solidFill>
-                              <a:latin typeface="Cambria Math" panose="02040503050406030204" pitchFamily="18" charset="0"/>
-                            </a:rPr>
-                            <m:t>sin</m:t>
+                            <m:t>Asin</m:t>
                           </m:r>
                         </m:fName>
                         <m:e>
@@ -4958,7 +4952,7 @@
             </p:txBody>
           </p:sp>
         </mc:Choice>
-        <mc:Fallback>
+        <mc:Fallback xmlns="">
           <p:sp>
             <p:nvSpPr>
               <p:cNvPr id="14" name="TextBox 13">
@@ -5104,44 +5098,8 @@
           </a:prstGeom>
         </p:spPr>
       </p:pic>
-      <p:pic>
-        <p:nvPicPr>
-          <p:cNvPr id="10" name="Picture 9">
-            <a:extLst>
-              <a:ext uri="{FF2B5EF4-FFF2-40B4-BE49-F238E27FC236}">
-                <a16:creationId xmlns:a16="http://schemas.microsoft.com/office/drawing/2014/main" id="{91E7F158-0F13-4864-B02B-1F9D44FCE2CC}"/>
-              </a:ext>
-            </a:extLst>
-          </p:cNvPr>
-          <p:cNvPicPr>
-            <a:picLocks noChangeAspect="1"/>
-          </p:cNvPicPr>
-          <p:nvPr/>
-        </p:nvPicPr>
-        <p:blipFill>
-          <a:blip r:embed="rId3">
-            <a:extLst>
-              <a:ext uri="{28A0092B-C50C-407E-A947-70E740481C1C}">
-                <a14:useLocalDpi xmlns:a14="http://schemas.microsoft.com/office/drawing/2010/main" val="0"/>
-              </a:ext>
-            </a:extLst>
-          </a:blip>
-          <a:stretch>
-            <a:fillRect/>
-          </a:stretch>
-        </p:blipFill>
-        <p:spPr>
-          <a:xfrm>
-            <a:off x="4360994" y="945947"/>
-            <a:ext cx="4359165" cy="4093632"/>
-          </a:xfrm>
-          <a:prstGeom prst="rect">
-            <a:avLst/>
-          </a:prstGeom>
-        </p:spPr>
-      </p:pic>
-      <mc:AlternateContent xmlns:mc="http://schemas.openxmlformats.org/markup-compatibility/2006">
-        <mc:Choice xmlns:a14="http://schemas.microsoft.com/office/drawing/2010/main" Requires="a14">
+      <mc:AlternateContent xmlns:mc="http://schemas.openxmlformats.org/markup-compatibility/2006" xmlns:a14="http://schemas.microsoft.com/office/drawing/2010/main">
+        <mc:Choice Requires="a14">
           <p:sp>
             <p:nvSpPr>
               <p:cNvPr id="11" name="TextBox 10">
@@ -5279,7 +5237,7 @@
             </p:txBody>
           </p:sp>
         </mc:Choice>
-        <mc:Fallback>
+        <mc:Fallback xmlns="">
           <p:sp>
             <p:nvSpPr>
               <p:cNvPr id="11" name="TextBox 10">
@@ -5328,10 +5286,10 @@
         <mc:Choice xmlns:a14="http://schemas.microsoft.com/office/drawing/2010/main" Requires="a14">
           <p:sp>
             <p:nvSpPr>
-              <p:cNvPr id="12" name="TextBox 11">
+              <p:cNvPr id="3" name="TextBox 2">
                 <a:extLst>
                   <a:ext uri="{FF2B5EF4-FFF2-40B4-BE49-F238E27FC236}">
-                    <a16:creationId xmlns:a16="http://schemas.microsoft.com/office/drawing/2014/main" id="{148801A5-1120-496D-A171-9FE00C4892F2}"/>
+                    <a16:creationId xmlns:a16="http://schemas.microsoft.com/office/drawing/2014/main" id="{0E74D18F-F70B-4812-95D2-957C8D560E59}"/>
                   </a:ext>
                 </a:extLst>
               </p:cNvPr>
@@ -5340,8 +5298,8 @@
             </p:nvSpPr>
             <p:spPr>
               <a:xfrm>
-                <a:off x="8720159" y="1464732"/>
-                <a:ext cx="3649133" cy="2722925"/>
+                <a:off x="4593168" y="1490133"/>
+                <a:ext cx="7260166" cy="4694427"/>
               </a:xfrm>
               <a:prstGeom prst="rect">
                 <a:avLst/>
@@ -5354,39 +5312,127 @@
               </a:bodyPr>
               <a:lstStyle/>
               <a:p>
+                <a:pPr marL="400050" indent="-400050">
+                  <a:buFont typeface="+mj-lt"/>
+                  <a:buAutoNum type="romanUcPeriod"/>
+                </a:pPr>
                 <a:r>
                   <a:rPr lang="en-US" dirty="0"/>
-                  <a:t>Fill the gaps in time to match the actual time grid using equations of motion</a:t>
+                  <a:t>Remove time jumps (shift by interpolations)</a:t>
                 </a:r>
               </a:p>
               <a:p>
-                <a:pPr/>
+                <a:pPr marL="400050" indent="-400050">
+                  <a:buFont typeface="+mj-lt"/>
+                  <a:buAutoNum type="romanUcPeriod"/>
+                </a:pPr>
+                <a:r>
+                  <a:rPr lang="en-US" dirty="0"/>
+                  <a:t>Perform nonlinear alignment for each generalized coordinate</a:t>
+                </a:r>
+              </a:p>
+              <a:p>
+                <a:pPr marL="800100" lvl="1" indent="-342900">
+                  <a:buAutoNum type="arabicPeriod"/>
+                </a:pPr>
+                <a:r>
+                  <a:rPr lang="en-US" dirty="0"/>
+                  <a:t>Identify families of key time points (100 points per period)</a:t>
+                </a:r>
+              </a:p>
+              <a:p>
+                <a:pPr marL="800100" lvl="1" indent="-342900">
+                  <a:buAutoNum type="arabicPeriod"/>
+                </a:pPr>
+                <a:r>
+                  <a:rPr lang="en-US" dirty="0"/>
+                  <a:t>For each family of key points:</a:t>
+                </a:r>
+              </a:p>
+              <a:p>
+                <a:pPr marL="1257300" lvl="2" indent="-342900">
+                  <a:buFont typeface="+mj-lt"/>
+                  <a:buAutoNum type="alphaLcParenR"/>
+                </a:pPr>
+                <a:r>
+                  <a:rPr lang="en-US" dirty="0"/>
+                  <a:t>Transform simulation key points to real key points </a:t>
+                </a:r>
+              </a:p>
+              <a:p>
+                <a:pPr marL="1257300" lvl="2" indent="-342900">
+                  <a:buFont typeface="+mj-lt"/>
+                  <a:buAutoNum type="alphaLcParenR"/>
+                </a:pPr>
+                <a:r>
+                  <a:rPr lang="en-US" dirty="0"/>
+                  <a:t>Linearly stretch coordinate</a:t>
+                </a:r>
+              </a:p>
+              <a:p>
+                <a:pPr marL="800100" lvl="1" indent="-342900">
+                  <a:buAutoNum type="arabicPeriod"/>
+                </a:pPr>
+                <a:r>
+                  <a:rPr lang="en-US" dirty="0"/>
+                  <a:t>Combine stretched coordinates and transformed key points into sparse solution</a:t>
+                </a:r>
+              </a:p>
+              <a:p>
+                <a:pPr marL="342900" indent="-342900">
+                  <a:spcAft>
+                    <a:spcPts val="600"/>
+                  </a:spcAft>
+                  <a:buAutoNum type="romanUcPeriod"/>
+                </a:pPr>
+                <a:r>
+                  <a:rPr lang="en-US" dirty="0"/>
+                  <a:t>Map the sparse solution onto the initial time grid using 2</a:t>
+                </a:r>
+                <a:r>
+                  <a:rPr lang="en-US" baseline="30000" dirty="0"/>
+                  <a:t>nd</a:t>
+                </a:r>
+                <a:r>
+                  <a:rPr lang="en-US" dirty="0"/>
+                  <a:t> order EOM:</a:t>
+                </a:r>
+              </a:p>
+              <a:p>
+                <a:pPr algn="ctr">
+                  <a:spcBef>
+                    <a:spcPts val="600"/>
+                  </a:spcBef>
+                  <a:spcAft>
+                    <a:spcPts val="600"/>
+                  </a:spcAft>
+                </a:pPr>
                 <a14:m>
                   <m:oMathPara xmlns:m="http://schemas.openxmlformats.org/officeDocument/2006/math">
                     <m:oMathParaPr>
-                      <m:jc m:val="left"/>
+                      <m:jc m:val="center"/>
                     </m:oMathParaPr>
                     <m:oMath xmlns:m="http://schemas.openxmlformats.org/officeDocument/2006/math">
                       <m:r>
-                        <a:rPr lang="en-US" sz="1600" b="0" i="1" smtClean="0">
+                        <a:rPr lang="en-US" i="1">
                           <a:latin typeface="Cambria Math" panose="02040503050406030204" pitchFamily="18" charset="0"/>
                         </a:rPr>
                         <m:t>𝑎</m:t>
                       </m:r>
                       <m:r>
-                        <a:rPr lang="en-US" sz="1600" b="0" i="1" smtClean="0">
+                        <a:rPr lang="en-US" i="1">
                           <a:latin typeface="Cambria Math" panose="02040503050406030204" pitchFamily="18" charset="0"/>
                         </a:rPr>
                         <m:t>[</m:t>
                       </m:r>
                       <m:r>
-                        <a:rPr lang="en-US" sz="1600" b="0" i="1" smtClean="0">
+                        <a:rPr lang="en-US" i="1">
                           <a:latin typeface="Cambria Math" panose="02040503050406030204" pitchFamily="18" charset="0"/>
                         </a:rPr>
                         <m:t>𝑖</m:t>
                       </m:r>
                       <m:r>
-                        <a:rPr lang="en-US" sz="1600" b="0" i="1" smtClean="0">
+                        <a:rPr lang="en-US" i="1">
                           <a:latin typeface="Cambria Math" panose="02040503050406030204" pitchFamily="18" charset="0"/>
                         </a:rPr>
                         <m:t>]=−</m:t>
@@ -5394,20 +5440,20 @@
                       <m:f>
                         <m:fPr>
                           <m:ctrlPr>
-                            <a:rPr lang="en-US" sz="1600" b="0" i="1" smtClean="0">
+                            <a:rPr lang="en-US" i="1">
                               <a:latin typeface="Cambria Math" panose="02040503050406030204" pitchFamily="18" charset="0"/>
                             </a:rPr>
                           </m:ctrlPr>
                         </m:fPr>
                         <m:num>
                           <m:r>
-                            <a:rPr lang="en-US" sz="1600" b="0" i="1" smtClean="0">
+                            <a:rPr lang="en-US" i="1">
                               <a:latin typeface="Cambria Math" panose="02040503050406030204" pitchFamily="18" charset="0"/>
                             </a:rPr>
                             <m:t>𝐺</m:t>
                           </m:r>
                           <m:r>
-                            <a:rPr lang="en-US" sz="1600" b="0" i="1" smtClean="0">
+                            <a:rPr lang="en-US" i="1">
                               <a:latin typeface="Cambria Math" panose="02040503050406030204" pitchFamily="18" charset="0"/>
                             </a:rPr>
                             <m:t> </m:t>
@@ -5415,14 +5461,14 @@
                           <m:sSub>
                             <m:sSubPr>
                               <m:ctrlPr>
-                                <a:rPr lang="en-US" sz="1600" b="0" i="1" smtClean="0">
+                                <a:rPr lang="en-US" i="1">
                                   <a:latin typeface="Cambria Math" panose="02040503050406030204" pitchFamily="18" charset="0"/>
                                 </a:rPr>
                               </m:ctrlPr>
                             </m:sSubPr>
                             <m:e>
                               <m:r>
-                                <a:rPr lang="en-US" sz="1600" b="0" i="1" smtClean="0">
+                                <a:rPr lang="en-US" i="1">
                                   <a:latin typeface="Cambria Math" panose="02040503050406030204" pitchFamily="18" charset="0"/>
                                 </a:rPr>
                                 <m:t>𝑀</m:t>
@@ -5430,7 +5476,7 @@
                             </m:e>
                             <m:sub>
                               <m:r>
-                                <a:rPr lang="en-US" sz="1600" b="0" i="1" smtClean="0">
+                                <a:rPr lang="en-US" i="1">
                                   <a:latin typeface="Cambria Math" panose="02040503050406030204" pitchFamily="18" charset="0"/>
                                 </a:rPr>
                                 <m:t>𝐸</m:t>
@@ -5442,32 +5488,32 @@
                           <m:sSup>
                             <m:sSupPr>
                               <m:ctrlPr>
-                                <a:rPr lang="en-US" sz="1600" b="0" i="1" smtClean="0">
+                                <a:rPr lang="en-US" i="1">
                                   <a:latin typeface="Cambria Math" panose="02040503050406030204" pitchFamily="18" charset="0"/>
                                 </a:rPr>
                               </m:ctrlPr>
                             </m:sSupPr>
                             <m:e>
                               <m:r>
-                                <a:rPr lang="en-US" sz="1600" b="0" i="1" smtClean="0">
+                                <a:rPr lang="en-US" i="1">
                                   <a:latin typeface="Cambria Math" panose="02040503050406030204" pitchFamily="18" charset="0"/>
                                 </a:rPr>
                                 <m:t>𝑟</m:t>
                               </m:r>
                               <m:r>
-                                <a:rPr lang="en-US" sz="1600" b="0" i="1" smtClean="0">
+                                <a:rPr lang="en-US" i="1">
                                   <a:latin typeface="Cambria Math" panose="02040503050406030204" pitchFamily="18" charset="0"/>
                                 </a:rPr>
                                 <m:t>[</m:t>
                               </m:r>
                               <m:r>
-                                <a:rPr lang="en-US" sz="1600" b="0" i="1" smtClean="0">
+                                <a:rPr lang="en-US" i="1">
                                   <a:latin typeface="Cambria Math" panose="02040503050406030204" pitchFamily="18" charset="0"/>
                                 </a:rPr>
                                 <m:t>𝑖</m:t>
                               </m:r>
                               <m:r>
-                                <a:rPr lang="en-US" sz="1600" b="0" i="1" smtClean="0">
+                                <a:rPr lang="en-US" i="1">
                                   <a:latin typeface="Cambria Math" panose="02040503050406030204" pitchFamily="18" charset="0"/>
                                 </a:rPr>
                                 <m:t>]</m:t>
@@ -5475,7 +5521,7 @@
                             </m:e>
                             <m:sup>
                               <m:r>
-                                <a:rPr lang="en-US" sz="1600" b="0" i="1" smtClean="0">
+                                <a:rPr lang="en-US" i="1">
                                   <a:latin typeface="Cambria Math" panose="02040503050406030204" pitchFamily="18" charset="0"/>
                                 </a:rPr>
                                 <m:t>2</m:t>
@@ -5487,18 +5533,18 @@
                     </m:oMath>
                   </m:oMathPara>
                 </a14:m>
-                <a:endParaRPr lang="en-US" sz="1600" dirty="0"/>
+                <a:endParaRPr lang="en-US" dirty="0"/>
               </a:p>
               <a:p>
-                <a:pPr/>
+                <a:pPr algn="ctr"/>
                 <a14:m>
                   <m:oMathPara xmlns:m="http://schemas.openxmlformats.org/officeDocument/2006/math">
                     <m:oMathParaPr>
-                      <m:jc m:val="left"/>
+                      <m:jc m:val="center"/>
                     </m:oMathParaPr>
                     <m:oMath xmlns:m="http://schemas.openxmlformats.org/officeDocument/2006/math">
                       <m:r>
-                        <a:rPr lang="en-US" sz="1600" b="0" i="1" smtClean="0">
+                        <a:rPr lang="en-US" i="1">
                           <a:latin typeface="Cambria Math" panose="02040503050406030204" pitchFamily="18" charset="0"/>
                         </a:rPr>
                         <m:t>𝑣</m:t>
@@ -5508,20 +5554,20 @@
                           <m:begChr m:val="["/>
                           <m:endChr m:val="]"/>
                           <m:ctrlPr>
-                            <a:rPr lang="en-US" sz="1600" b="0" i="1" smtClean="0">
+                            <a:rPr lang="en-US" i="1">
                               <a:latin typeface="Cambria Math" panose="02040503050406030204" pitchFamily="18" charset="0"/>
                             </a:rPr>
                           </m:ctrlPr>
                         </m:dPr>
                         <m:e>
                           <m:r>
-                            <a:rPr lang="en-US" sz="1600" b="0" i="1" smtClean="0">
+                            <a:rPr lang="en-US" i="1">
                               <a:latin typeface="Cambria Math" panose="02040503050406030204" pitchFamily="18" charset="0"/>
                             </a:rPr>
                             <m:t>𝑖</m:t>
                           </m:r>
                           <m:r>
-                            <a:rPr lang="en-US" sz="1600" b="0" i="1" smtClean="0">
+                            <a:rPr lang="en-US" i="1">
                               <a:latin typeface="Cambria Math" panose="02040503050406030204" pitchFamily="18" charset="0"/>
                             </a:rPr>
                             <m:t>+1</m:t>
@@ -5529,13 +5575,13 @@
                         </m:e>
                       </m:d>
                       <m:r>
-                        <a:rPr lang="en-US" sz="1600" b="0" i="1" smtClean="0">
+                        <a:rPr lang="en-US" i="1">
                           <a:latin typeface="Cambria Math" panose="02040503050406030204" pitchFamily="18" charset="0"/>
                         </a:rPr>
                         <m:t>=</m:t>
                       </m:r>
                       <m:r>
-                        <a:rPr lang="en-US" sz="1600" b="0" i="1" smtClean="0">
+                        <a:rPr lang="en-US" i="1">
                           <a:latin typeface="Cambria Math" panose="02040503050406030204" pitchFamily="18" charset="0"/>
                         </a:rPr>
                         <m:t>𝑣</m:t>
@@ -5545,14 +5591,14 @@
                           <m:begChr m:val="["/>
                           <m:endChr m:val="]"/>
                           <m:ctrlPr>
-                            <a:rPr lang="en-US" sz="1600" b="0" i="1" smtClean="0">
+                            <a:rPr lang="en-US" i="1">
                               <a:latin typeface="Cambria Math" panose="02040503050406030204" pitchFamily="18" charset="0"/>
                             </a:rPr>
                           </m:ctrlPr>
                         </m:dPr>
                         <m:e>
                           <m:r>
-                            <a:rPr lang="en-US" sz="1600" b="0" i="1" smtClean="0">
+                            <a:rPr lang="en-US" i="1">
                               <a:latin typeface="Cambria Math" panose="02040503050406030204" pitchFamily="18" charset="0"/>
                             </a:rPr>
                             <m:t>𝑖</m:t>
@@ -5560,13 +5606,13 @@
                         </m:e>
                       </m:d>
                       <m:r>
-                        <a:rPr lang="en-US" sz="1600" b="0" i="1" smtClean="0">
+                        <a:rPr lang="en-US" i="1">
                           <a:latin typeface="Cambria Math" panose="02040503050406030204" pitchFamily="18" charset="0"/>
                         </a:rPr>
                         <m:t>+</m:t>
                       </m:r>
                       <m:r>
-                        <a:rPr lang="en-US" sz="1600" b="0" i="1" smtClean="0">
+                        <a:rPr lang="en-US" i="1">
                           <a:latin typeface="Cambria Math" panose="02040503050406030204" pitchFamily="18" charset="0"/>
                         </a:rPr>
                         <m:t>𝑎</m:t>
@@ -5576,14 +5622,14 @@
                           <m:begChr m:val="["/>
                           <m:endChr m:val="]"/>
                           <m:ctrlPr>
-                            <a:rPr lang="en-US" sz="1600" b="0" i="1" smtClean="0">
+                            <a:rPr lang="en-US" i="1">
                               <a:latin typeface="Cambria Math" panose="02040503050406030204" pitchFamily="18" charset="0"/>
                             </a:rPr>
                           </m:ctrlPr>
                         </m:dPr>
                         <m:e>
                           <m:r>
-                            <a:rPr lang="en-US" sz="1600" b="0" i="1" smtClean="0">
+                            <a:rPr lang="en-US" i="1">
                               <a:latin typeface="Cambria Math" panose="02040503050406030204" pitchFamily="18" charset="0"/>
                             </a:rPr>
                             <m:t>𝑖</m:t>
@@ -5591,14 +5637,14 @@
                         </m:e>
                       </m:d>
                       <m:r>
-                        <a:rPr lang="en-US" sz="1600" b="0" i="1" smtClean="0">
+                        <a:rPr lang="en-US" i="1">
                           <a:latin typeface="Cambria Math" panose="02040503050406030204" pitchFamily="18" charset="0"/>
                           <a:ea typeface="Cambria Math" panose="02040503050406030204" pitchFamily="18" charset="0"/>
                         </a:rPr>
                         <m:t>∙</m:t>
                       </m:r>
                       <m:r>
-                        <a:rPr lang="en-US" sz="1600" b="0" i="1" smtClean="0">
+                        <a:rPr lang="en-US" i="1">
                           <a:latin typeface="Cambria Math" panose="02040503050406030204" pitchFamily="18" charset="0"/>
                         </a:rPr>
                         <m:t>𝑑𝑡</m:t>
@@ -5606,21 +5652,22 @@
                     </m:oMath>
                   </m:oMathPara>
                 </a14:m>
-                <a:endParaRPr lang="en-US" sz="1600" dirty="0"/>
+                <a:endParaRPr lang="en-US" dirty="0"/>
               </a:p>
               <a:p>
-                <a:endParaRPr lang="en-US" sz="1600" dirty="0"/>
+                <a:pPr algn="ctr"/>
+                <a:endParaRPr lang="en-US" dirty="0"/>
               </a:p>
               <a:p>
-                <a:pPr/>
+                <a:pPr algn="ctr"/>
                 <a14:m>
                   <m:oMathPara xmlns:m="http://schemas.openxmlformats.org/officeDocument/2006/math">
                     <m:oMathParaPr>
-                      <m:jc m:val="left"/>
+                      <m:jc m:val="center"/>
                     </m:oMathParaPr>
                     <m:oMath xmlns:m="http://schemas.openxmlformats.org/officeDocument/2006/math">
                       <m:r>
-                        <a:rPr lang="en-US" sz="1600" b="0" i="1" smtClean="0">
+                        <a:rPr lang="en-US" i="1">
                           <a:latin typeface="Cambria Math" panose="02040503050406030204" pitchFamily="18" charset="0"/>
                         </a:rPr>
                         <m:t>𝑟</m:t>
@@ -5630,20 +5677,20 @@
                           <m:begChr m:val="["/>
                           <m:endChr m:val="]"/>
                           <m:ctrlPr>
-                            <a:rPr lang="en-US" sz="1600" b="0" i="1" smtClean="0">
+                            <a:rPr lang="en-US" i="1">
                               <a:latin typeface="Cambria Math" panose="02040503050406030204" pitchFamily="18" charset="0"/>
                             </a:rPr>
                           </m:ctrlPr>
                         </m:dPr>
                         <m:e>
                           <m:r>
-                            <a:rPr lang="en-US" sz="1600" b="0" i="1" smtClean="0">
+                            <a:rPr lang="en-US" i="1">
                               <a:latin typeface="Cambria Math" panose="02040503050406030204" pitchFamily="18" charset="0"/>
                             </a:rPr>
                             <m:t>𝑖</m:t>
                           </m:r>
                           <m:r>
-                            <a:rPr lang="en-US" sz="1600" b="0" i="1" smtClean="0">
+                            <a:rPr lang="en-US" i="1">
                               <a:latin typeface="Cambria Math" panose="02040503050406030204" pitchFamily="18" charset="0"/>
                             </a:rPr>
                             <m:t>+1</m:t>
@@ -5651,13 +5698,13 @@
                         </m:e>
                       </m:d>
                       <m:r>
-                        <a:rPr lang="en-US" sz="1600" b="0" i="1" smtClean="0">
+                        <a:rPr lang="en-US" i="1">
                           <a:latin typeface="Cambria Math" panose="02040503050406030204" pitchFamily="18" charset="0"/>
                         </a:rPr>
                         <m:t>=</m:t>
                       </m:r>
                       <m:r>
-                        <a:rPr lang="en-US" sz="1600" b="0" i="1" smtClean="0">
+                        <a:rPr lang="en-US" i="1">
                           <a:latin typeface="Cambria Math" panose="02040503050406030204" pitchFamily="18" charset="0"/>
                         </a:rPr>
                         <m:t>𝑟</m:t>
@@ -5667,14 +5714,14 @@
                           <m:begChr m:val="["/>
                           <m:endChr m:val="]"/>
                           <m:ctrlPr>
-                            <a:rPr lang="en-US" sz="1600" b="0" i="1" smtClean="0">
+                            <a:rPr lang="en-US" i="1">
                               <a:latin typeface="Cambria Math" panose="02040503050406030204" pitchFamily="18" charset="0"/>
                             </a:rPr>
                           </m:ctrlPr>
                         </m:dPr>
                         <m:e>
                           <m:r>
-                            <a:rPr lang="en-US" sz="1600" b="0" i="1" smtClean="0">
+                            <a:rPr lang="en-US" i="1">
                               <a:latin typeface="Cambria Math" panose="02040503050406030204" pitchFamily="18" charset="0"/>
                             </a:rPr>
                             <m:t>𝑖</m:t>
@@ -5682,19 +5729,13 @@
                         </m:e>
                       </m:d>
                       <m:r>
-                        <a:rPr lang="en-US" sz="1600" b="0" i="1" smtClean="0">
+                        <a:rPr lang="en-US" i="1">
                           <a:latin typeface="Cambria Math" panose="02040503050406030204" pitchFamily="18" charset="0"/>
                         </a:rPr>
-                        <m:t>+</m:t>
+                        <m:t>+(</m:t>
                       </m:r>
                       <m:r>
-                        <a:rPr lang="en-US" sz="1600" b="0" i="1" smtClean="0">
-                          <a:latin typeface="Cambria Math" panose="02040503050406030204" pitchFamily="18" charset="0"/>
-                        </a:rPr>
-                        <m:t>(</m:t>
-                      </m:r>
-                      <m:r>
-                        <a:rPr lang="en-US" sz="1600" b="0" i="1" smtClean="0">
+                        <a:rPr lang="en-US" i="1">
                           <a:latin typeface="Cambria Math" panose="02040503050406030204" pitchFamily="18" charset="0"/>
                         </a:rPr>
                         <m:t>𝑣</m:t>
@@ -5704,20 +5745,20 @@
                           <m:begChr m:val="["/>
                           <m:endChr m:val="]"/>
                           <m:ctrlPr>
-                            <a:rPr lang="en-US" sz="1600" b="0" i="1" smtClean="0">
+                            <a:rPr lang="en-US" i="1">
                               <a:latin typeface="Cambria Math" panose="02040503050406030204" pitchFamily="18" charset="0"/>
                             </a:rPr>
                           </m:ctrlPr>
                         </m:dPr>
                         <m:e>
                           <m:r>
-                            <a:rPr lang="en-US" sz="1600" b="0" i="1" smtClean="0">
+                            <a:rPr lang="en-US" i="1">
                               <a:latin typeface="Cambria Math" panose="02040503050406030204" pitchFamily="18" charset="0"/>
                             </a:rPr>
                             <m:t>𝑖</m:t>
                           </m:r>
                           <m:r>
-                            <a:rPr lang="en-US" sz="1600" b="0" i="1" smtClean="0">
+                            <a:rPr lang="en-US" i="1">
                               <a:latin typeface="Cambria Math" panose="02040503050406030204" pitchFamily="18" charset="0"/>
                             </a:rPr>
                             <m:t>+1</m:t>
@@ -5725,13 +5766,13 @@
                         </m:e>
                       </m:d>
                       <m:r>
-                        <a:rPr lang="en-US" sz="1600" b="0" i="1" smtClean="0">
+                        <a:rPr lang="en-US" i="1">
                           <a:latin typeface="Cambria Math" panose="02040503050406030204" pitchFamily="18" charset="0"/>
                         </a:rPr>
                         <m:t>+</m:t>
                       </m:r>
                       <m:r>
-                        <a:rPr lang="en-US" sz="1600" b="0" i="1" smtClean="0">
+                        <a:rPr lang="en-US" i="1">
                           <a:latin typeface="Cambria Math" panose="02040503050406030204" pitchFamily="18" charset="0"/>
                         </a:rPr>
                         <m:t>𝑣</m:t>
@@ -5741,14 +5782,14 @@
                           <m:begChr m:val="["/>
                           <m:endChr m:val="]"/>
                           <m:ctrlPr>
-                            <a:rPr lang="en-US" sz="1600" b="0" i="1" smtClean="0">
+                            <a:rPr lang="en-US" i="1">
                               <a:latin typeface="Cambria Math" panose="02040503050406030204" pitchFamily="18" charset="0"/>
                             </a:rPr>
                           </m:ctrlPr>
                         </m:dPr>
                         <m:e>
                           <m:r>
-                            <a:rPr lang="en-US" sz="1600" b="0" i="1" smtClean="0">
+                            <a:rPr lang="en-US" i="1">
                               <a:latin typeface="Cambria Math" panose="02040503050406030204" pitchFamily="18" charset="0"/>
                             </a:rPr>
                             <m:t>𝑖</m:t>
@@ -5756,13 +5797,13 @@
                         </m:e>
                       </m:d>
                       <m:r>
-                        <a:rPr lang="en-US" sz="1600" b="0" i="1" smtClean="0">
+                        <a:rPr lang="en-US" i="1">
                           <a:latin typeface="Cambria Math" panose="02040503050406030204" pitchFamily="18" charset="0"/>
                         </a:rPr>
                         <m:t>)</m:t>
                       </m:r>
                       <m:r>
-                        <a:rPr lang="en-US" sz="1600" b="0" i="1" smtClean="0">
+                        <a:rPr lang="en-US" i="1">
                           <a:latin typeface="Cambria Math" panose="02040503050406030204" pitchFamily="18" charset="0"/>
                         </a:rPr>
                         <m:t>𝑑𝑡</m:t>
@@ -5770,9 +5811,6 @@
                     </m:oMath>
                   </m:oMathPara>
                 </a14:m>
-                <a:endParaRPr lang="en-US" sz="1600" dirty="0"/>
-              </a:p>
-              <a:p>
                 <a:endParaRPr lang="en-US" dirty="0"/>
               </a:p>
               <a:p>
@@ -5781,16 +5819,22 @@
                   <a:t> </a:t>
                 </a:r>
               </a:p>
+              <a:p>
+                <a:pPr marL="800100" lvl="1" indent="-342900">
+                  <a:buAutoNum type="arabicPeriod"/>
+                </a:pPr>
+                <a:endParaRPr lang="en-US" dirty="0"/>
+              </a:p>
             </p:txBody>
           </p:sp>
         </mc:Choice>
         <mc:Fallback>
           <p:sp>
             <p:nvSpPr>
-              <p:cNvPr id="12" name="TextBox 11">
+              <p:cNvPr id="3" name="TextBox 2">
                 <a:extLst>
                   <a:ext uri="{FF2B5EF4-FFF2-40B4-BE49-F238E27FC236}">
-                    <a16:creationId xmlns:a16="http://schemas.microsoft.com/office/drawing/2014/main" id="{148801A5-1120-496D-A171-9FE00C4892F2}"/>
+                    <a16:creationId xmlns:a16="http://schemas.microsoft.com/office/drawing/2014/main" id="{0E74D18F-F70B-4812-95D2-957C8D560E59}"/>
                   </a:ext>
                 </a:extLst>
               </p:cNvPr>
@@ -5801,8 +5845,8 @@
             </p:nvSpPr>
             <p:spPr>
               <a:xfrm>
-                <a:off x="8720159" y="1464732"/>
-                <a:ext cx="3649133" cy="2722925"/>
+                <a:off x="4593168" y="1490133"/>
+                <a:ext cx="7260166" cy="4694427"/>
               </a:xfrm>
               <a:prstGeom prst="rect">
                 <a:avLst/>
@@ -5810,7 +5854,7 @@
               <a:blipFill>
                 <a:blip r:embed="rId5"/>
                 <a:stretch>
-                  <a:fillRect l="-1336" t="-1119"/>
+                  <a:fillRect l="-672" t="-649"/>
                 </a:stretch>
               </a:blipFill>
             </p:spPr>
@@ -5829,6 +5873,45 @@
           </p:sp>
         </mc:Fallback>
       </mc:AlternateContent>
+      <p:sp>
+        <p:nvSpPr>
+          <p:cNvPr id="4" name="TextBox 3">
+            <a:extLst>
+              <a:ext uri="{FF2B5EF4-FFF2-40B4-BE49-F238E27FC236}">
+                <a16:creationId xmlns:a16="http://schemas.microsoft.com/office/drawing/2014/main" id="{F5A1A82A-F268-4B76-BFD6-EB609EB15BE6}"/>
+              </a:ext>
+            </a:extLst>
+          </p:cNvPr>
+          <p:cNvSpPr txBox="1"/>
+          <p:nvPr/>
+        </p:nvSpPr>
+        <p:spPr>
+          <a:xfrm>
+            <a:off x="4593168" y="1055712"/>
+            <a:ext cx="5016500" cy="369332"/>
+          </a:xfrm>
+          <a:prstGeom prst="rect">
+            <a:avLst/>
+          </a:prstGeom>
+          <a:noFill/>
+        </p:spPr>
+        <p:txBody>
+          <a:bodyPr wrap="square" rtlCol="0">
+            <a:spAutoFit/>
+          </a:bodyPr>
+          <a:lstStyle/>
+          <a:p>
+            <a:r>
+              <a:rPr lang="en-US" u="sng" dirty="0">
+                <a:solidFill>
+                  <a:srgbClr val="873C94"/>
+                </a:solidFill>
+              </a:rPr>
+              <a:t>Full algorithm:</a:t>
+            </a:r>
+          </a:p>
+        </p:txBody>
+      </p:sp>
     </p:spTree>
     <p:extLst>
       <p:ext uri="{BB962C8B-B14F-4D97-AF65-F5344CB8AC3E}">

</xml_diff>